<commit_message>
updating presentation - BP
</commit_message>
<xml_diff>
--- a/DNUG Presentation.pptx
+++ b/DNUG Presentation.pptx
@@ -17,8 +17,9 @@
     <p:sldId id="265" r:id="rId11"/>
     <p:sldId id="266" r:id="rId12"/>
     <p:sldId id="267" r:id="rId13"/>
-    <p:sldId id="268" r:id="rId14"/>
-    <p:sldId id="269" r:id="rId15"/>
+    <p:sldId id="270" r:id="rId14"/>
+    <p:sldId id="268" r:id="rId15"/>
+    <p:sldId id="269" r:id="rId16"/>
   </p:sldIdLst>
   <p:sldSz cx="12192000" cy="6858000"/>
   <p:notesSz cx="6858000" cy="9144000"/>
@@ -299,7 +300,7 @@
           <a:p>
             <a:fld id="{48A87A34-81AB-432B-8DAE-1953F412C126}" type="datetimeFigureOut">
               <a:rPr lang="en-US" dirty="0"/>
-              <a:t>7/24/2017</a:t>
+              <a:t>7/25/2017</a:t>
             </a:fld>
             <a:endParaRPr lang="en-US" dirty="0"/>
           </a:p>
@@ -561,7 +562,7 @@
           <a:p>
             <a:fld id="{48A87A34-81AB-432B-8DAE-1953F412C126}" type="datetimeFigureOut">
               <a:rPr lang="en-US" dirty="0"/>
-              <a:t>7/24/2017</a:t>
+              <a:t>7/25/2017</a:t>
             </a:fld>
             <a:endParaRPr lang="en-US" dirty="0"/>
           </a:p>
@@ -788,7 +789,7 @@
             <a:fld id="{48A87A34-81AB-432B-8DAE-1953F412C126}" type="datetimeFigureOut">
               <a:rPr lang="en-US" dirty="0"/>
               <a:pPr/>
-              <a:t>7/24/2017</a:t>
+              <a:t>7/25/2017</a:t>
             </a:fld>
             <a:endParaRPr lang="en-US" dirty="0"/>
           </a:p>
@@ -1094,7 +1095,7 @@
             <a:fld id="{48A87A34-81AB-432B-8DAE-1953F412C126}" type="datetimeFigureOut">
               <a:rPr lang="en-US" dirty="0"/>
               <a:pPr/>
-              <a:t>7/24/2017</a:t>
+              <a:t>7/25/2017</a:t>
             </a:fld>
             <a:endParaRPr lang="en-US" dirty="0"/>
           </a:p>
@@ -1563,7 +1564,7 @@
             <a:fld id="{48A87A34-81AB-432B-8DAE-1953F412C126}" type="datetimeFigureOut">
               <a:rPr lang="en-US" dirty="0"/>
               <a:pPr/>
-              <a:t>7/24/2017</a:t>
+              <a:t>7/25/2017</a:t>
             </a:fld>
             <a:endParaRPr lang="en-US" dirty="0"/>
           </a:p>
@@ -2105,7 +2106,7 @@
           <a:p>
             <a:fld id="{48A87A34-81AB-432B-8DAE-1953F412C126}" type="datetimeFigureOut">
               <a:rPr lang="en-US" dirty="0"/>
-              <a:t>7/24/2017</a:t>
+              <a:t>7/25/2017</a:t>
             </a:fld>
             <a:endParaRPr lang="en-US" dirty="0"/>
           </a:p>
@@ -2874,7 +2875,7 @@
           <a:p>
             <a:fld id="{48A87A34-81AB-432B-8DAE-1953F412C126}" type="datetimeFigureOut">
               <a:rPr lang="en-US" dirty="0"/>
-              <a:t>7/24/2017</a:t>
+              <a:t>7/25/2017</a:t>
             </a:fld>
             <a:endParaRPr lang="en-US" dirty="0"/>
           </a:p>
@@ -3044,7 +3045,7 @@
           <a:p>
             <a:fld id="{48A87A34-81AB-432B-8DAE-1953F412C126}" type="datetimeFigureOut">
               <a:rPr lang="en-US" dirty="0"/>
-              <a:t>7/24/2017</a:t>
+              <a:t>7/25/2017</a:t>
             </a:fld>
             <a:endParaRPr lang="en-US" dirty="0"/>
           </a:p>
@@ -3263,7 +3264,7 @@
             <a:fld id="{48A87A34-81AB-432B-8DAE-1953F412C126}" type="datetimeFigureOut">
               <a:rPr lang="en-US" dirty="0"/>
               <a:pPr/>
-              <a:t>7/24/2017</a:t>
+              <a:t>7/25/2017</a:t>
             </a:fld>
             <a:endParaRPr lang="en-US" dirty="0"/>
           </a:p>
@@ -3438,7 +3439,7 @@
           <a:p>
             <a:fld id="{48A87A34-81AB-432B-8DAE-1953F412C126}" type="datetimeFigureOut">
               <a:rPr lang="en-US" dirty="0"/>
-              <a:t>7/24/2017</a:t>
+              <a:t>7/25/2017</a:t>
             </a:fld>
             <a:endParaRPr lang="en-US" dirty="0"/>
           </a:p>
@@ -3723,7 +3724,7 @@
             <a:fld id="{48A87A34-81AB-432B-8DAE-1953F412C126}" type="datetimeFigureOut">
               <a:rPr lang="en-US" dirty="0"/>
               <a:pPr/>
-              <a:t>7/24/2017</a:t>
+              <a:t>7/25/2017</a:t>
             </a:fld>
             <a:endParaRPr lang="en-US" dirty="0"/>
           </a:p>
@@ -3960,7 +3961,7 @@
           <a:p>
             <a:fld id="{48A87A34-81AB-432B-8DAE-1953F412C126}" type="datetimeFigureOut">
               <a:rPr lang="en-US" dirty="0"/>
-              <a:t>7/24/2017</a:t>
+              <a:t>7/25/2017</a:t>
             </a:fld>
             <a:endParaRPr lang="en-US" dirty="0"/>
           </a:p>
@@ -4334,7 +4335,7 @@
           <a:p>
             <a:fld id="{48A87A34-81AB-432B-8DAE-1953F412C126}" type="datetimeFigureOut">
               <a:rPr lang="en-US" dirty="0"/>
-              <a:t>7/24/2017</a:t>
+              <a:t>7/25/2017</a:t>
             </a:fld>
             <a:endParaRPr lang="en-US" dirty="0"/>
           </a:p>
@@ -4447,7 +4448,7 @@
           <a:p>
             <a:fld id="{48A87A34-81AB-432B-8DAE-1953F412C126}" type="datetimeFigureOut">
               <a:rPr lang="en-US" dirty="0"/>
-              <a:t>7/24/2017</a:t>
+              <a:t>7/25/2017</a:t>
             </a:fld>
             <a:endParaRPr lang="en-US" dirty="0"/>
           </a:p>
@@ -4537,7 +4538,7 @@
           <a:p>
             <a:fld id="{48A87A34-81AB-432B-8DAE-1953F412C126}" type="datetimeFigureOut">
               <a:rPr lang="en-US" dirty="0"/>
-              <a:t>7/24/2017</a:t>
+              <a:t>7/25/2017</a:t>
             </a:fld>
             <a:endParaRPr lang="en-US" dirty="0"/>
           </a:p>
@@ -4781,7 +4782,7 @@
           <a:p>
             <a:fld id="{48A87A34-81AB-432B-8DAE-1953F412C126}" type="datetimeFigureOut">
               <a:rPr lang="en-US" dirty="0"/>
-              <a:t>7/24/2017</a:t>
+              <a:t>7/25/2017</a:t>
             </a:fld>
             <a:endParaRPr lang="en-US" dirty="0"/>
           </a:p>
@@ -5033,7 +5034,7 @@
           <a:p>
             <a:fld id="{48A87A34-81AB-432B-8DAE-1953F412C126}" type="datetimeFigureOut">
               <a:rPr lang="en-US" dirty="0"/>
-              <a:t>7/24/2017</a:t>
+              <a:t>7/25/2017</a:t>
             </a:fld>
             <a:endParaRPr lang="en-US" dirty="0"/>
           </a:p>
@@ -5272,7 +5273,7 @@
             <a:fld id="{48A87A34-81AB-432B-8DAE-1953F412C126}" type="datetimeFigureOut">
               <a:rPr lang="en-US" dirty="0"/>
               <a:pPr/>
-              <a:t>7/24/2017</a:t>
+              <a:t>7/25/2017</a:t>
             </a:fld>
             <a:endParaRPr lang="en-US" dirty="0"/>
           </a:p>
@@ -5702,7 +5703,7 @@
           <a:p>
             <a:r>
               <a:rPr lang="en-US" dirty="0"/>
-              <a:t>Angular 4</a:t>
+              <a:t>Angular 2+</a:t>
             </a:r>
           </a:p>
         </p:txBody>
@@ -6094,6 +6095,122 @@
           <p:cNvPr id="2" name="Title 1">
             <a:extLst>
               <a:ext uri="{FF2B5EF4-FFF2-40B4-BE49-F238E27FC236}">
+                <a16:creationId xmlns:a16="http://schemas.microsoft.com/office/drawing/2014/main" id="{B2284E81-6DF9-4ABF-8EA7-131EAF978FEF}"/>
+              </a:ext>
+            </a:extLst>
+          </p:cNvPr>
+          <p:cNvSpPr>
+            <a:spLocks noGrp="1"/>
+          </p:cNvSpPr>
+          <p:nvPr>
+            <p:ph type="title"/>
+          </p:nvPr>
+        </p:nvSpPr>
+        <p:spPr/>
+        <p:txBody>
+          <a:bodyPr/>
+          <a:lstStyle/>
+          <a:p>
+            <a:r>
+              <a:rPr lang="en-US" dirty="0"/>
+              <a:t>Things not covered</a:t>
+            </a:r>
+          </a:p>
+        </p:txBody>
+      </p:sp>
+      <p:sp>
+        <p:nvSpPr>
+          <p:cNvPr id="3" name="Content Placeholder 2">
+            <a:extLst>
+              <a:ext uri="{FF2B5EF4-FFF2-40B4-BE49-F238E27FC236}">
+                <a16:creationId xmlns:a16="http://schemas.microsoft.com/office/drawing/2014/main" id="{4F2BFDF7-566E-44B4-8FAB-942C8F6B885B}"/>
+              </a:ext>
+            </a:extLst>
+          </p:cNvPr>
+          <p:cNvSpPr>
+            <a:spLocks noGrp="1"/>
+          </p:cNvSpPr>
+          <p:nvPr>
+            <p:ph idx="1"/>
+          </p:nvPr>
+        </p:nvSpPr>
+        <p:spPr/>
+        <p:txBody>
+          <a:bodyPr/>
+          <a:lstStyle/>
+          <a:p>
+            <a:r>
+              <a:rPr lang="en-US" dirty="0"/>
+              <a:t>Directives</a:t>
+            </a:r>
+          </a:p>
+          <a:p>
+            <a:r>
+              <a:rPr lang="en-US" dirty="0"/>
+              <a:t>Pipes</a:t>
+            </a:r>
+          </a:p>
+          <a:p>
+            <a:r>
+              <a:rPr lang="en-US" dirty="0"/>
+              <a:t>Guards</a:t>
+            </a:r>
+          </a:p>
+          <a:p>
+            <a:r>
+              <a:rPr lang="en-US" dirty="0"/>
+              <a:t>Modules</a:t>
+            </a:r>
+          </a:p>
+          <a:p>
+            <a:r>
+              <a:rPr lang="en-US" dirty="0"/>
+              <a:t>Unit tests</a:t>
+            </a:r>
+          </a:p>
+          <a:p>
+            <a:r>
+              <a:rPr lang="en-US" dirty="0"/>
+              <a:t>E2E tests</a:t>
+            </a:r>
+          </a:p>
+        </p:txBody>
+      </p:sp>
+    </p:spTree>
+    <p:extLst>
+      <p:ext uri="{BB962C8B-B14F-4D97-AF65-F5344CB8AC3E}">
+        <p14:creationId xmlns:p14="http://schemas.microsoft.com/office/powerpoint/2010/main" val="801993002"/>
+      </p:ext>
+    </p:extLst>
+  </p:cSld>
+  <p:clrMapOvr>
+    <a:masterClrMapping/>
+  </p:clrMapOvr>
+</p:sld>
+</file>
+
+<file path=ppt/slides/slide14.xml><?xml version="1.0" encoding="utf-8"?>
+<p:sld xmlns:a="http://schemas.openxmlformats.org/drawingml/2006/main" xmlns:r="http://schemas.openxmlformats.org/officeDocument/2006/relationships" xmlns:p="http://schemas.openxmlformats.org/presentationml/2006/main">
+  <p:cSld>
+    <p:spTree>
+      <p:nvGrpSpPr>
+        <p:cNvPr id="1" name=""/>
+        <p:cNvGrpSpPr/>
+        <p:nvPr/>
+      </p:nvGrpSpPr>
+      <p:grpSpPr>
+        <a:xfrm>
+          <a:off x="0" y="0"/>
+          <a:ext cx="0" cy="0"/>
+          <a:chOff x="0" y="0"/>
+          <a:chExt cx="0" cy="0"/>
+        </a:xfrm>
+      </p:grpSpPr>
+      <p:sp>
+        <p:nvSpPr>
+          <p:cNvPr id="2" name="Title 1">
+            <a:extLst>
+              <a:ext uri="{FF2B5EF4-FFF2-40B4-BE49-F238E27FC236}">
                 <a16:creationId xmlns:a16="http://schemas.microsoft.com/office/drawing/2014/main" id="{D7D0596D-0090-4C4A-A37D-38546C68F397}"/>
               </a:ext>
             </a:extLst>
@@ -6208,7 +6325,7 @@
 </p:sld>
 </file>
 
-<file path=ppt/slides/slide14.xml><?xml version="1.0" encoding="utf-8"?>
+<file path=ppt/slides/slide15.xml><?xml version="1.0" encoding="utf-8"?>
 <p:sld xmlns:a="http://schemas.openxmlformats.org/drawingml/2006/main" xmlns:r="http://schemas.openxmlformats.org/officeDocument/2006/relationships" xmlns:p="http://schemas.openxmlformats.org/presentationml/2006/main">
   <p:cSld>
     <p:spTree>
@@ -7011,12 +7128,6 @@
             <a:r>
               <a:rPr lang="en-US" dirty="0"/>
               <a:t>Need to be paired with Services to retain state, communicate with other components, and interact with outside web services</a:t>
-            </a:r>
-          </a:p>
-          <a:p>
-            <a:r>
-              <a:rPr lang="en-US" dirty="0"/>
-              <a:t>Replace both “controllers” and “directives” from Angular 1 (look very similar to directives)</a:t>
             </a:r>
           </a:p>
           <a:p>

</xml_diff>